<commit_message>
Aulas T1-A09 e T1-A10 + updates
</commit_message>
<xml_diff>
--- a/aulas/t/SCO-T1-A01-A02.pptx
+++ b/aulas/t/SCO-T1-A01-A02.pptx
@@ -14050,7 +14050,7 @@
           <a:p>
             <a:pPr algn="r"/>
             <a:br>
-              <a:rPr lang="pt-PT" sz="1000" b="1" i="1" dirty="0">
+              <a:rPr lang="pt-PT" sz="1000" b="1" i="1" cap="small" dirty="0">
                 <a:solidFill>
                   <a:srgbClr val="FF0000"/>
                 </a:solidFill>
@@ -14058,58 +14058,13 @@
               </a:rPr>
             </a:br>
             <a:r>
-              <a:rPr lang="pt-PT" sz="1800" b="1" i="1" dirty="0">
+              <a:rPr lang="pt-PT" sz="1800" b="1" i="1" cap="small" dirty="0">
                 <a:solidFill>
                   <a:srgbClr val="FF0000"/>
                 </a:solidFill>
                 <a:latin typeface="Arial" charset="0"/>
               </a:rPr>
-              <a:t>T</a:t>
-            </a:r>
-            <a:r>
-              <a:rPr lang="pt-PT" sz="1600" b="1" i="1" dirty="0">
-                <a:solidFill>
-                  <a:srgbClr val="FF0000"/>
-                </a:solidFill>
-                <a:latin typeface="Arial" charset="0"/>
-              </a:rPr>
-              <a:t>ESTE </a:t>
-            </a:r>
-            <a:r>
-              <a:rPr lang="pt-PT" sz="1800" b="1" i="1" dirty="0">
-                <a:solidFill>
-                  <a:srgbClr val="FF0000"/>
-                </a:solidFill>
-                <a:latin typeface="Arial" charset="0"/>
-              </a:rPr>
-              <a:t>T</a:t>
-            </a:r>
-            <a:r>
-              <a:rPr lang="pt-PT" sz="1600" b="1" i="1" dirty="0">
-                <a:solidFill>
-                  <a:srgbClr val="FF0000"/>
-                </a:solidFill>
-                <a:latin typeface="Arial" charset="0"/>
-              </a:rPr>
-              <a:t>EÓRICO </a:t>
-            </a:r>
-            <a:r>
-              <a:rPr lang="pt-PT" sz="1800" b="1" i="1" dirty="0">
-                <a:solidFill>
-                  <a:srgbClr val="FF0000"/>
-                </a:solidFill>
-                <a:latin typeface="Arial" charset="0"/>
-              </a:rPr>
-              <a:t>O</a:t>
-            </a:r>
-            <a:r>
-              <a:rPr lang="pt-PT" sz="1600" b="1" i="1" dirty="0">
-                <a:solidFill>
-                  <a:srgbClr val="FF0000"/>
-                </a:solidFill>
-                <a:latin typeface="Arial" charset="0"/>
-              </a:rPr>
-              <a:t>NLINE</a:t>
+              <a:t>Questionário Teórico Online</a:t>
             </a:r>
             <a:endParaRPr lang="en-GB" sz="1600" b="1" i="1" dirty="0">
               <a:solidFill>
@@ -14131,7 +14086,7 @@
         <p:spPr bwMode="auto">
           <a:xfrm>
             <a:off x="540000" y="900000"/>
-            <a:ext cx="8064448" cy="3938245"/>
+            <a:ext cx="8064448" cy="3568914"/>
           </a:xfrm>
           <a:prstGeom prst="rect">
             <a:avLst/>
@@ -14151,18 +14106,6 @@
           </a:bodyPr>
           <a:lstStyle/>
           <a:p>
-            <a:pPr algn="l" defTabSz="704085">
-              <a:lnSpc>
-                <a:spcPct val="120000"/>
-              </a:lnSpc>
-            </a:pPr>
-            <a:r>
-              <a:rPr lang="pt-PT" sz="2000" b="0" i="0" dirty="0"/>
-              <a:t>Questões em:</a:t>
-            </a:r>
-            <a:endParaRPr lang="pt-PT" sz="3600" i="0" dirty="0"/>
-          </a:p>
-          <a:p>
             <a:pPr marL="357188" lvl="1" indent="-177800" algn="l" defTabSz="704085">
               <a:lnSpc>
                 <a:spcPct val="120000"/>
@@ -14223,8 +14166,8 @@
               <a:t>Password do teste de </a:t>
             </a:r>
             <a:r>
-              <a:rPr lang="pt-PT" sz="2800" b="0" i="0" dirty="0" err="1"/>
-              <a:t>CPUs</a:t>
+              <a:rPr lang="pt-PT" sz="2800" i="0" dirty="0"/>
+              <a:t>T-Q01</a:t>
             </a:r>
             <a:r>
               <a:rPr lang="pt-PT" sz="2800" b="0" i="0" dirty="0"/>

</xml_diff>